<commit_message>
Lots of code cleanup. More unit tests, all passing except for the new CountdownTimer.
</commit_message>
<xml_diff>
--- a/docs/Drawings.pptx
+++ b/docs/Drawings.pptx
@@ -104,6 +104,11 @@
       </a:defRPr>
     </a:lvl9pPr>
   </p:defaultTextStyle>
+  <p:extLst>
+    <p:ext uri="{EFAFB233-063F-42B5-8137-9DF3F51BA10A}">
+      <p15:sldGuideLst xmlns:p15="http://schemas.microsoft.com/office/powerpoint/2012/main"/>
+    </p:ext>
+  </p:extLst>
 </p:presentation>
 </file>
 
@@ -893,7 +898,7 @@
 <dgm:dataModel xmlns:dgm="http://schemas.openxmlformats.org/drawingml/2006/diagram" xmlns:a="http://schemas.openxmlformats.org/drawingml/2006/main">
   <dgm:ptLst>
     <dgm:pt modelId="{0DBA40EA-43D7-436D-A451-8DE8201F880E}" type="doc">
-      <dgm:prSet loTypeId="urn:microsoft.com/office/officeart/2005/8/layout/hierarchy4" loCatId="hierarchy" qsTypeId="urn:microsoft.com/office/officeart/2005/8/quickstyle/3d2" qsCatId="3D" csTypeId="urn:microsoft.com/office/officeart/2005/8/colors/colorful4" csCatId="colorful" phldr="1"/>
+      <dgm:prSet loTypeId="urn:microsoft.com/office/officeart/2005/8/layout/architecture" loCatId="hierarchy" qsTypeId="urn:microsoft.com/office/officeart/2005/8/quickstyle/3d2" qsCatId="3D" csTypeId="urn:microsoft.com/office/officeart/2005/8/colors/colorful4" csCatId="colorful" phldr="1"/>
       <dgm:spPr/>
       <dgm:t>
         <a:bodyPr/>
@@ -1430,7 +1435,7 @@
         </a:p>
       </dgm:t>
     </dgm:pt>
-    <dgm:pt modelId="{B34DA5D3-CEC6-479C-B71E-E98466F92136}" type="pres">
+    <dgm:pt modelId="{A457FCD7-7585-452D-8B31-757F725B2F83}" type="pres">
       <dgm:prSet presAssocID="{0DBA40EA-43D7-436D-A451-8DE8201F880E}" presName="Name0" presStyleCnt="0">
         <dgm:presLayoutVars>
           <dgm:chPref val="1"/>
@@ -1442,11 +1447,11 @@
       </dgm:prSet>
       <dgm:spPr/>
     </dgm:pt>
-    <dgm:pt modelId="{DBA2954B-9AA8-4668-8A93-E32E5D8286B4}" type="pres">
+    <dgm:pt modelId="{AA5501CC-ADA3-4533-A9A1-065962F024AB}" type="pres">
       <dgm:prSet presAssocID="{F3548EB9-3522-4D73-B1D9-20D6447D7B27}" presName="vertOne" presStyleCnt="0"/>
       <dgm:spPr/>
     </dgm:pt>
-    <dgm:pt modelId="{69729B0A-080E-4A3E-B2F0-770C546A516A}" type="pres">
+    <dgm:pt modelId="{08233A73-9A0D-4E66-95FC-BA163A645E70}" type="pres">
       <dgm:prSet presAssocID="{F3548EB9-3522-4D73-B1D9-20D6447D7B27}" presName="txOne" presStyleLbl="node0" presStyleIdx="0" presStyleCnt="1">
         <dgm:presLayoutVars>
           <dgm:chPref val="3"/>
@@ -1454,19 +1459,19 @@
       </dgm:prSet>
       <dgm:spPr/>
     </dgm:pt>
-    <dgm:pt modelId="{37C23B23-71CF-467F-9C1B-C6DAF1B1693B}" type="pres">
+    <dgm:pt modelId="{1E3AE262-6ABE-4162-909A-4E9ED2603B0F}" type="pres">
       <dgm:prSet presAssocID="{F3548EB9-3522-4D73-B1D9-20D6447D7B27}" presName="parTransOne" presStyleCnt="0"/>
       <dgm:spPr/>
     </dgm:pt>
-    <dgm:pt modelId="{226C3FE9-C620-4014-A3CE-EA223F12D0F7}" type="pres">
+    <dgm:pt modelId="{5D075902-FDE4-4F7D-A8C3-9A2B7EBA5DE1}" type="pres">
       <dgm:prSet presAssocID="{F3548EB9-3522-4D73-B1D9-20D6447D7B27}" presName="horzOne" presStyleCnt="0"/>
       <dgm:spPr/>
     </dgm:pt>
-    <dgm:pt modelId="{1B232D23-882A-41C6-8710-2F3B029E170E}" type="pres">
+    <dgm:pt modelId="{53E93033-B21D-407F-A1C4-2DD302857AB0}" type="pres">
       <dgm:prSet presAssocID="{4C0BCE1E-5434-4BB5-854A-DB95D578A4BC}" presName="vertTwo" presStyleCnt="0"/>
       <dgm:spPr/>
     </dgm:pt>
-    <dgm:pt modelId="{3CDD9677-3892-4F7E-92AD-87DCCE0D81CB}" type="pres">
+    <dgm:pt modelId="{B60AB936-4F9A-4736-A0EC-DC832F1A80F6}" type="pres">
       <dgm:prSet presAssocID="{4C0BCE1E-5434-4BB5-854A-DB95D578A4BC}" presName="txTwo" presStyleLbl="node2" presStyleIdx="0" presStyleCnt="1">
         <dgm:presLayoutVars>
           <dgm:chPref val="3"/>
@@ -1474,19 +1479,19 @@
       </dgm:prSet>
       <dgm:spPr/>
     </dgm:pt>
-    <dgm:pt modelId="{1BF4EE35-46AA-4542-BAFB-13B4701DCDEC}" type="pres">
+    <dgm:pt modelId="{AFB26770-8D90-437C-AD15-B523C13947EA}" type="pres">
       <dgm:prSet presAssocID="{4C0BCE1E-5434-4BB5-854A-DB95D578A4BC}" presName="parTransTwo" presStyleCnt="0"/>
       <dgm:spPr/>
     </dgm:pt>
-    <dgm:pt modelId="{2D7407DE-8D07-4D42-9768-DEF13C026DF9}" type="pres">
+    <dgm:pt modelId="{D8FD778E-DEB0-472A-B37E-E3F04564EB13}" type="pres">
       <dgm:prSet presAssocID="{4C0BCE1E-5434-4BB5-854A-DB95D578A4BC}" presName="horzTwo" presStyleCnt="0"/>
       <dgm:spPr/>
     </dgm:pt>
-    <dgm:pt modelId="{CB5FCA3D-780B-423B-9754-01E41ED1D594}" type="pres">
+    <dgm:pt modelId="{A1C9B497-B456-4787-8581-915C33240C2D}" type="pres">
       <dgm:prSet presAssocID="{6E49BF13-6721-430C-85F8-DAA134DD6B6A}" presName="vertThree" presStyleCnt="0"/>
       <dgm:spPr/>
     </dgm:pt>
-    <dgm:pt modelId="{2FE62EC0-C842-428A-B906-DD4A34CDC1CF}" type="pres">
+    <dgm:pt modelId="{5D77E15A-7581-468C-9800-762AADAB13E3}" type="pres">
       <dgm:prSet presAssocID="{6E49BF13-6721-430C-85F8-DAA134DD6B6A}" presName="txThree" presStyleLbl="node3" presStyleIdx="0" presStyleCnt="1">
         <dgm:presLayoutVars>
           <dgm:chPref val="3"/>
@@ -1494,15 +1499,15 @@
       </dgm:prSet>
       <dgm:spPr/>
     </dgm:pt>
-    <dgm:pt modelId="{D3F6EBA5-BB46-43E3-B256-5A113FC1C4A5}" type="pres">
+    <dgm:pt modelId="{F46C9B4E-C29F-4694-A2FA-5EF8E024E11C}" type="pres">
       <dgm:prSet presAssocID="{6E49BF13-6721-430C-85F8-DAA134DD6B6A}" presName="parTransThree" presStyleCnt="0"/>
       <dgm:spPr/>
     </dgm:pt>
-    <dgm:pt modelId="{A586EF35-2A45-4D18-ABB5-BF6EF3D15321}" type="pres">
+    <dgm:pt modelId="{FF1C7EAA-706C-42CC-8CF3-2E5765BC3B94}" type="pres">
       <dgm:prSet presAssocID="{6E49BF13-6721-430C-85F8-DAA134DD6B6A}" presName="horzThree" presStyleCnt="0"/>
       <dgm:spPr/>
     </dgm:pt>
-    <dgm:pt modelId="{0F1FCD40-246E-4C8F-82CA-90260D71BCB7}" type="pres">
+    <dgm:pt modelId="{62542401-9AC3-4C16-A245-C259851FAC96}" type="pres">
       <dgm:prSet presAssocID="{F6327D7D-2103-46A5-9519-4BEEA6204048}" presName="vertFour" presStyleCnt="0">
         <dgm:presLayoutVars>
           <dgm:chPref val="3"/>
@@ -1510,7 +1515,7 @@
       </dgm:prSet>
       <dgm:spPr/>
     </dgm:pt>
-    <dgm:pt modelId="{59D12D5A-EFE0-482C-A94F-56460B06118C}" type="pres">
+    <dgm:pt modelId="{C43D5AE9-3214-4789-BC87-E3001FD01C27}" type="pres">
       <dgm:prSet presAssocID="{F6327D7D-2103-46A5-9519-4BEEA6204048}" presName="txFour" presStyleLbl="node4" presStyleIdx="0" presStyleCnt="4">
         <dgm:presLayoutVars>
           <dgm:chPref val="3"/>
@@ -1518,15 +1523,15 @@
       </dgm:prSet>
       <dgm:spPr/>
     </dgm:pt>
-    <dgm:pt modelId="{9FD6864B-409B-40AC-850C-948AA49D00E6}" type="pres">
+    <dgm:pt modelId="{6BE3341D-71BF-45CE-9C16-04C857A27AB2}" type="pres">
       <dgm:prSet presAssocID="{F6327D7D-2103-46A5-9519-4BEEA6204048}" presName="horzFour" presStyleCnt="0"/>
       <dgm:spPr/>
     </dgm:pt>
-    <dgm:pt modelId="{3B546E5B-7712-44CA-AF91-EA985049788D}" type="pres">
+    <dgm:pt modelId="{8AA85D46-C946-413D-AD35-FEE319322CFF}" type="pres">
       <dgm:prSet presAssocID="{43A6CCFA-24F0-430E-AD3A-F8DB0BFAE743}" presName="sibSpaceFour" presStyleCnt="0"/>
       <dgm:spPr/>
     </dgm:pt>
-    <dgm:pt modelId="{57B1BF5D-8B51-4CA9-A1CC-373782455A5B}" type="pres">
+    <dgm:pt modelId="{C19CA4DE-8954-4EA2-9C8A-5CA4B104206A}" type="pres">
       <dgm:prSet presAssocID="{F9131504-0565-4221-87D4-C3215670C6DD}" presName="vertFour" presStyleCnt="0">
         <dgm:presLayoutVars>
           <dgm:chPref val="3"/>
@@ -1534,7 +1539,7 @@
       </dgm:prSet>
       <dgm:spPr/>
     </dgm:pt>
-    <dgm:pt modelId="{D1F5E78B-25DE-428E-B813-08806B9B7793}" type="pres">
+    <dgm:pt modelId="{1949C09A-0593-4247-9373-62ED81F32222}" type="pres">
       <dgm:prSet presAssocID="{F9131504-0565-4221-87D4-C3215670C6DD}" presName="txFour" presStyleLbl="node4" presStyleIdx="1" presStyleCnt="4">
         <dgm:presLayoutVars>
           <dgm:chPref val="3"/>
@@ -1542,15 +1547,15 @@
       </dgm:prSet>
       <dgm:spPr/>
     </dgm:pt>
-    <dgm:pt modelId="{A453A851-2791-401F-A6FD-B63D6F335953}" type="pres">
+    <dgm:pt modelId="{A1E4B383-15E1-4F8F-AA2D-B19B185A7C78}" type="pres">
       <dgm:prSet presAssocID="{F9131504-0565-4221-87D4-C3215670C6DD}" presName="horzFour" presStyleCnt="0"/>
       <dgm:spPr/>
     </dgm:pt>
-    <dgm:pt modelId="{FA76ABB4-D2A9-499A-980D-8C16B5C68A2B}" type="pres">
+    <dgm:pt modelId="{4474C44D-9E30-4AFD-BD46-BCB8B407C66D}" type="pres">
       <dgm:prSet presAssocID="{11BB73D9-EDEB-4899-BBB0-8E5364C77684}" presName="sibSpaceFour" presStyleCnt="0"/>
       <dgm:spPr/>
     </dgm:pt>
-    <dgm:pt modelId="{344A63F9-CCB4-4686-A16A-C268F637C663}" type="pres">
+    <dgm:pt modelId="{2497912A-BE84-488E-B4FD-1118FBD34D78}" type="pres">
       <dgm:prSet presAssocID="{1953C0D4-8A5C-49A8-80A2-323648945864}" presName="vertFour" presStyleCnt="0">
         <dgm:presLayoutVars>
           <dgm:chPref val="3"/>
@@ -1558,7 +1563,7 @@
       </dgm:prSet>
       <dgm:spPr/>
     </dgm:pt>
-    <dgm:pt modelId="{90B1EA35-54B9-4B32-8E6B-4DA66BBD99CA}" type="pres">
+    <dgm:pt modelId="{059CAE2B-CF50-443E-AA57-42318D8EEB8F}" type="pres">
       <dgm:prSet presAssocID="{1953C0D4-8A5C-49A8-80A2-323648945864}" presName="txFour" presStyleLbl="node4" presStyleIdx="2" presStyleCnt="4">
         <dgm:presLayoutVars>
           <dgm:chPref val="3"/>
@@ -1566,15 +1571,15 @@
       </dgm:prSet>
       <dgm:spPr/>
     </dgm:pt>
-    <dgm:pt modelId="{4868EDAB-B4D6-47FB-8818-34B345B3A91C}" type="pres">
+    <dgm:pt modelId="{48F44CA2-56AD-47FB-9637-B06D5C58E0DD}" type="pres">
       <dgm:prSet presAssocID="{1953C0D4-8A5C-49A8-80A2-323648945864}" presName="horzFour" presStyleCnt="0"/>
       <dgm:spPr/>
     </dgm:pt>
-    <dgm:pt modelId="{DA4029AC-7CF6-4336-9553-909E71701A43}" type="pres">
+    <dgm:pt modelId="{4275DD66-6777-40DF-865B-77D708B75E33}" type="pres">
       <dgm:prSet presAssocID="{22873ECA-94A8-47E2-B38D-B05FCBD06D14}" presName="sibSpaceFour" presStyleCnt="0"/>
       <dgm:spPr/>
     </dgm:pt>
-    <dgm:pt modelId="{D550CBFA-0C32-415F-A261-245A18D0D465}" type="pres">
+    <dgm:pt modelId="{1ADD540F-7EA5-4B32-9ADF-292F27D9942E}" type="pres">
       <dgm:prSet presAssocID="{29B65D1B-1812-480F-BCAB-E9BA48D1E7F4}" presName="vertFour" presStyleCnt="0">
         <dgm:presLayoutVars>
           <dgm:chPref val="3"/>
@@ -1582,7 +1587,7 @@
       </dgm:prSet>
       <dgm:spPr/>
     </dgm:pt>
-    <dgm:pt modelId="{09E4595E-CECD-419B-8483-E158BAC637A2}" type="pres">
+    <dgm:pt modelId="{A3A03A86-F67B-477E-A931-B80DDC86DDCF}" type="pres">
       <dgm:prSet presAssocID="{29B65D1B-1812-480F-BCAB-E9BA48D1E7F4}" presName="txFour" presStyleLbl="node4" presStyleIdx="3" presStyleCnt="4">
         <dgm:presLayoutVars>
           <dgm:chPref val="3"/>
@@ -1590,54 +1595,54 @@
       </dgm:prSet>
       <dgm:spPr/>
     </dgm:pt>
-    <dgm:pt modelId="{92BF49A8-8CDA-4918-98D1-3260E87EDBD0}" type="pres">
+    <dgm:pt modelId="{9136546F-4733-466F-8D52-29504A872090}" type="pres">
       <dgm:prSet presAssocID="{29B65D1B-1812-480F-BCAB-E9BA48D1E7F4}" presName="horzFour" presStyleCnt="0"/>
       <dgm:spPr/>
     </dgm:pt>
   </dgm:ptLst>
   <dgm:cxnLst>
     <dgm:cxn modelId="{3DA7D405-7120-49F3-8F67-9E7CA02E2667}" srcId="{6E49BF13-6721-430C-85F8-DAA134DD6B6A}" destId="{1953C0D4-8A5C-49A8-80A2-323648945864}" srcOrd="2" destOrd="0" parTransId="{7749ACA3-9980-48AF-87BB-64817431B083}" sibTransId="{22873ECA-94A8-47E2-B38D-B05FCBD06D14}"/>
-    <dgm:cxn modelId="{E636340A-249E-4550-BA09-6424134AB1B3}" type="presOf" srcId="{1953C0D4-8A5C-49A8-80A2-323648945864}" destId="{90B1EA35-54B9-4B32-8E6B-4DA66BBD99CA}" srcOrd="0" destOrd="0" presId="urn:microsoft.com/office/officeart/2005/8/layout/hierarchy4"/>
-    <dgm:cxn modelId="{EE07BB2A-1085-473A-832A-DF26293D08FF}" type="presOf" srcId="{29B65D1B-1812-480F-BCAB-E9BA48D1E7F4}" destId="{09E4595E-CECD-419B-8483-E158BAC637A2}" srcOrd="0" destOrd="0" presId="urn:microsoft.com/office/officeart/2005/8/layout/hierarchy4"/>
-    <dgm:cxn modelId="{73C4CF3E-B915-4965-A8C2-4B8BC5B9AB8F}" type="presOf" srcId="{4C0BCE1E-5434-4BB5-854A-DB95D578A4BC}" destId="{3CDD9677-3892-4F7E-92AD-87DCCE0D81CB}" srcOrd="0" destOrd="0" presId="urn:microsoft.com/office/officeart/2005/8/layout/hierarchy4"/>
     <dgm:cxn modelId="{1F9B6D64-D7F8-4F63-863A-1D52F8B2FAAE}" srcId="{4C0BCE1E-5434-4BB5-854A-DB95D578A4BC}" destId="{6E49BF13-6721-430C-85F8-DAA134DD6B6A}" srcOrd="0" destOrd="0" parTransId="{AF114F7C-55C0-4BE1-9096-13934D5CF3AC}" sibTransId="{9DC73297-8CC3-4A39-BE09-8A2EA6650668}"/>
     <dgm:cxn modelId="{A1D2E645-E1EC-4046-9752-5736B1368E7B}" srcId="{6E49BF13-6721-430C-85F8-DAA134DD6B6A}" destId="{F9131504-0565-4221-87D4-C3215670C6DD}" srcOrd="1" destOrd="0" parTransId="{CBB743E1-8ABF-4C2B-A830-05FCB455861A}" sibTransId="{11BB73D9-EDEB-4899-BBB0-8E5364C77684}"/>
     <dgm:cxn modelId="{7FB92D46-0CB2-4D54-BA6D-231EF75192EF}" srcId="{6E49BF13-6721-430C-85F8-DAA134DD6B6A}" destId="{F6327D7D-2103-46A5-9519-4BEEA6204048}" srcOrd="0" destOrd="0" parTransId="{C272144E-DF67-43BC-A668-F02390A560B1}" sibTransId="{43A6CCFA-24F0-430E-AD3A-F8DB0BFAE743}"/>
-    <dgm:cxn modelId="{3A475A52-8E69-47A3-81C1-B53FB66C3678}" type="presOf" srcId="{0DBA40EA-43D7-436D-A451-8DE8201F880E}" destId="{B34DA5D3-CEC6-479C-B71E-E98466F92136}" srcOrd="0" destOrd="0" presId="urn:microsoft.com/office/officeart/2005/8/layout/hierarchy4"/>
+    <dgm:cxn modelId="{07289466-3169-4BE5-8560-D9EF5C0E00D1}" type="presOf" srcId="{F6327D7D-2103-46A5-9519-4BEEA6204048}" destId="{C43D5AE9-3214-4789-BC87-E3001FD01C27}" srcOrd="0" destOrd="0" presId="urn:microsoft.com/office/officeart/2005/8/layout/architecture"/>
     <dgm:cxn modelId="{674C0A78-9469-471C-9AC5-10A9A21180F3}" srcId="{0DBA40EA-43D7-436D-A451-8DE8201F880E}" destId="{F3548EB9-3522-4D73-B1D9-20D6447D7B27}" srcOrd="0" destOrd="0" parTransId="{0A338401-33B4-4B15-8FA7-659A1B1A740E}" sibTransId="{596CC6A9-80A6-4865-BD1B-3BB38E9EFB15}"/>
-    <dgm:cxn modelId="{858ADC58-5222-437E-8851-FB871DC43CD2}" type="presOf" srcId="{F9131504-0565-4221-87D4-C3215670C6DD}" destId="{D1F5E78B-25DE-428E-B813-08806B9B7793}" srcOrd="0" destOrd="0" presId="urn:microsoft.com/office/officeart/2005/8/layout/hierarchy4"/>
+    <dgm:cxn modelId="{CE21487F-3CAC-4879-9584-234429AB3806}" type="presOf" srcId="{6E49BF13-6721-430C-85F8-DAA134DD6B6A}" destId="{5D77E15A-7581-468C-9800-762AADAB13E3}" srcOrd="0" destOrd="0" presId="urn:microsoft.com/office/officeart/2005/8/layout/architecture"/>
+    <dgm:cxn modelId="{8421EF89-633C-4AF7-BFD4-17D7CCC5FEA7}" type="presOf" srcId="{F3548EB9-3522-4D73-B1D9-20D6447D7B27}" destId="{08233A73-9A0D-4E66-95FC-BA163A645E70}" srcOrd="0" destOrd="0" presId="urn:microsoft.com/office/officeart/2005/8/layout/architecture"/>
+    <dgm:cxn modelId="{93C6F68F-D63E-4450-8789-008E978903ED}" type="presOf" srcId="{29B65D1B-1812-480F-BCAB-E9BA48D1E7F4}" destId="{A3A03A86-F67B-477E-A931-B80DDC86DDCF}" srcOrd="0" destOrd="0" presId="urn:microsoft.com/office/officeart/2005/8/layout/architecture"/>
+    <dgm:cxn modelId="{99F83D9F-8D56-4E7E-A37A-A8B2EBA14325}" type="presOf" srcId="{0DBA40EA-43D7-436D-A451-8DE8201F880E}" destId="{A457FCD7-7585-452D-8B31-757F725B2F83}" srcOrd="0" destOrd="0" presId="urn:microsoft.com/office/officeart/2005/8/layout/architecture"/>
     <dgm:cxn modelId="{618552AC-C6C2-4B81-A8FC-205091027A93}" srcId="{F3548EB9-3522-4D73-B1D9-20D6447D7B27}" destId="{4C0BCE1E-5434-4BB5-854A-DB95D578A4BC}" srcOrd="0" destOrd="0" parTransId="{08C87971-EC20-421B-90CA-E060F2AF02BE}" sibTransId="{2333317D-1BA5-45F8-B968-C84CE9E917DA}"/>
-    <dgm:cxn modelId="{35787BAD-2929-41BB-848F-DAC6CCCD2D6F}" type="presOf" srcId="{6E49BF13-6721-430C-85F8-DAA134DD6B6A}" destId="{2FE62EC0-C842-428A-B906-DD4A34CDC1CF}" srcOrd="0" destOrd="0" presId="urn:microsoft.com/office/officeart/2005/8/layout/hierarchy4"/>
-    <dgm:cxn modelId="{08590FCE-5E30-4DEB-9B9F-5608C040DB00}" type="presOf" srcId="{F3548EB9-3522-4D73-B1D9-20D6447D7B27}" destId="{69729B0A-080E-4A3E-B2F0-770C546A516A}" srcOrd="0" destOrd="0" presId="urn:microsoft.com/office/officeart/2005/8/layout/hierarchy4"/>
-    <dgm:cxn modelId="{6725E0E2-F98D-4C1A-A096-7CE54E4BA780}" type="presOf" srcId="{F6327D7D-2103-46A5-9519-4BEEA6204048}" destId="{59D12D5A-EFE0-482C-A94F-56460B06118C}" srcOrd="0" destOrd="0" presId="urn:microsoft.com/office/officeart/2005/8/layout/hierarchy4"/>
+    <dgm:cxn modelId="{643C39D3-A0E9-494B-9BA9-F399DDB16121}" type="presOf" srcId="{F9131504-0565-4221-87D4-C3215670C6DD}" destId="{1949C09A-0593-4247-9373-62ED81F32222}" srcOrd="0" destOrd="0" presId="urn:microsoft.com/office/officeart/2005/8/layout/architecture"/>
+    <dgm:cxn modelId="{6721F2DB-BBD9-4E2E-930D-B5D55F4BC9B7}" type="presOf" srcId="{4C0BCE1E-5434-4BB5-854A-DB95D578A4BC}" destId="{B60AB936-4F9A-4736-A0EC-DC832F1A80F6}" srcOrd="0" destOrd="0" presId="urn:microsoft.com/office/officeart/2005/8/layout/architecture"/>
+    <dgm:cxn modelId="{144CB1E3-BFF3-4F7B-AC0D-5CE45360913C}" type="presOf" srcId="{1953C0D4-8A5C-49A8-80A2-323648945864}" destId="{059CAE2B-CF50-443E-AA57-42318D8EEB8F}" srcOrd="0" destOrd="0" presId="urn:microsoft.com/office/officeart/2005/8/layout/architecture"/>
     <dgm:cxn modelId="{379BB8E9-FF17-4A92-82D7-7FDD2E915EA9}" srcId="{6E49BF13-6721-430C-85F8-DAA134DD6B6A}" destId="{29B65D1B-1812-480F-BCAB-E9BA48D1E7F4}" srcOrd="3" destOrd="0" parTransId="{D3A8B73C-69CB-4BF0-A918-986F19344E3B}" sibTransId="{29758030-6F2C-4B00-95DD-FC9A31B38AE1}"/>
-    <dgm:cxn modelId="{9EAB5FF9-7362-44CA-B311-8BF5FD4F10BA}" type="presParOf" srcId="{B34DA5D3-CEC6-479C-B71E-E98466F92136}" destId="{DBA2954B-9AA8-4668-8A93-E32E5D8286B4}" srcOrd="0" destOrd="0" presId="urn:microsoft.com/office/officeart/2005/8/layout/hierarchy4"/>
-    <dgm:cxn modelId="{577FF64A-F367-4635-BE9C-4D610A2C0E9F}" type="presParOf" srcId="{DBA2954B-9AA8-4668-8A93-E32E5D8286B4}" destId="{69729B0A-080E-4A3E-B2F0-770C546A516A}" srcOrd="0" destOrd="0" presId="urn:microsoft.com/office/officeart/2005/8/layout/hierarchy4"/>
-    <dgm:cxn modelId="{68B59363-2FE6-48B0-B984-3A7F17A2EF53}" type="presParOf" srcId="{DBA2954B-9AA8-4668-8A93-E32E5D8286B4}" destId="{37C23B23-71CF-467F-9C1B-C6DAF1B1693B}" srcOrd="1" destOrd="0" presId="urn:microsoft.com/office/officeart/2005/8/layout/hierarchy4"/>
-    <dgm:cxn modelId="{4DE0E8EF-7AFD-4376-97E9-FA882FC64E25}" type="presParOf" srcId="{DBA2954B-9AA8-4668-8A93-E32E5D8286B4}" destId="{226C3FE9-C620-4014-A3CE-EA223F12D0F7}" srcOrd="2" destOrd="0" presId="urn:microsoft.com/office/officeart/2005/8/layout/hierarchy4"/>
-    <dgm:cxn modelId="{CA1389BB-CB9B-4585-8E9F-E5E85174C4E3}" type="presParOf" srcId="{226C3FE9-C620-4014-A3CE-EA223F12D0F7}" destId="{1B232D23-882A-41C6-8710-2F3B029E170E}" srcOrd="0" destOrd="0" presId="urn:microsoft.com/office/officeart/2005/8/layout/hierarchy4"/>
-    <dgm:cxn modelId="{8F726F58-0A3A-4FD2-BAC1-B1E461032070}" type="presParOf" srcId="{1B232D23-882A-41C6-8710-2F3B029E170E}" destId="{3CDD9677-3892-4F7E-92AD-87DCCE0D81CB}" srcOrd="0" destOrd="0" presId="urn:microsoft.com/office/officeart/2005/8/layout/hierarchy4"/>
-    <dgm:cxn modelId="{2F8E3666-B29A-468D-BD79-96143B614647}" type="presParOf" srcId="{1B232D23-882A-41C6-8710-2F3B029E170E}" destId="{1BF4EE35-46AA-4542-BAFB-13B4701DCDEC}" srcOrd="1" destOrd="0" presId="urn:microsoft.com/office/officeart/2005/8/layout/hierarchy4"/>
-    <dgm:cxn modelId="{418CB27F-5A67-46DD-BC2D-94214EE041FA}" type="presParOf" srcId="{1B232D23-882A-41C6-8710-2F3B029E170E}" destId="{2D7407DE-8D07-4D42-9768-DEF13C026DF9}" srcOrd="2" destOrd="0" presId="urn:microsoft.com/office/officeart/2005/8/layout/hierarchy4"/>
-    <dgm:cxn modelId="{B8DE7FF7-6F22-414D-AA18-7C118440F82E}" type="presParOf" srcId="{2D7407DE-8D07-4D42-9768-DEF13C026DF9}" destId="{CB5FCA3D-780B-423B-9754-01E41ED1D594}" srcOrd="0" destOrd="0" presId="urn:microsoft.com/office/officeart/2005/8/layout/hierarchy4"/>
-    <dgm:cxn modelId="{18F886B0-8B4D-4245-AD43-D26DC4092645}" type="presParOf" srcId="{CB5FCA3D-780B-423B-9754-01E41ED1D594}" destId="{2FE62EC0-C842-428A-B906-DD4A34CDC1CF}" srcOrd="0" destOrd="0" presId="urn:microsoft.com/office/officeart/2005/8/layout/hierarchy4"/>
-    <dgm:cxn modelId="{D7F2A898-D2F2-4C6F-9079-2A502205755E}" type="presParOf" srcId="{CB5FCA3D-780B-423B-9754-01E41ED1D594}" destId="{D3F6EBA5-BB46-43E3-B256-5A113FC1C4A5}" srcOrd="1" destOrd="0" presId="urn:microsoft.com/office/officeart/2005/8/layout/hierarchy4"/>
-    <dgm:cxn modelId="{9EFC9A5B-B131-48AF-8902-67C57D7AFD85}" type="presParOf" srcId="{CB5FCA3D-780B-423B-9754-01E41ED1D594}" destId="{A586EF35-2A45-4D18-ABB5-BF6EF3D15321}" srcOrd="2" destOrd="0" presId="urn:microsoft.com/office/officeart/2005/8/layout/hierarchy4"/>
-    <dgm:cxn modelId="{CA68CEB4-53BD-4A0C-8E6E-F96EC828C000}" type="presParOf" srcId="{A586EF35-2A45-4D18-ABB5-BF6EF3D15321}" destId="{0F1FCD40-246E-4C8F-82CA-90260D71BCB7}" srcOrd="0" destOrd="0" presId="urn:microsoft.com/office/officeart/2005/8/layout/hierarchy4"/>
-    <dgm:cxn modelId="{D23AB980-39A0-42D7-8484-C1C4DDBCFA9C}" type="presParOf" srcId="{0F1FCD40-246E-4C8F-82CA-90260D71BCB7}" destId="{59D12D5A-EFE0-482C-A94F-56460B06118C}" srcOrd="0" destOrd="0" presId="urn:microsoft.com/office/officeart/2005/8/layout/hierarchy4"/>
-    <dgm:cxn modelId="{A0A64C90-8F90-4775-BB6F-6DA2360276C6}" type="presParOf" srcId="{0F1FCD40-246E-4C8F-82CA-90260D71BCB7}" destId="{9FD6864B-409B-40AC-850C-948AA49D00E6}" srcOrd="1" destOrd="0" presId="urn:microsoft.com/office/officeart/2005/8/layout/hierarchy4"/>
-    <dgm:cxn modelId="{E07ABECD-AFB9-4AD7-BF41-DAC87A7EB366}" type="presParOf" srcId="{A586EF35-2A45-4D18-ABB5-BF6EF3D15321}" destId="{3B546E5B-7712-44CA-AF91-EA985049788D}" srcOrd="1" destOrd="0" presId="urn:microsoft.com/office/officeart/2005/8/layout/hierarchy4"/>
-    <dgm:cxn modelId="{7606A2BE-6005-411B-AD75-99CF22D28A17}" type="presParOf" srcId="{A586EF35-2A45-4D18-ABB5-BF6EF3D15321}" destId="{57B1BF5D-8B51-4CA9-A1CC-373782455A5B}" srcOrd="2" destOrd="0" presId="urn:microsoft.com/office/officeart/2005/8/layout/hierarchy4"/>
-    <dgm:cxn modelId="{ED15C55F-6C60-4051-A1A7-6BDE169520FD}" type="presParOf" srcId="{57B1BF5D-8B51-4CA9-A1CC-373782455A5B}" destId="{D1F5E78B-25DE-428E-B813-08806B9B7793}" srcOrd="0" destOrd="0" presId="urn:microsoft.com/office/officeart/2005/8/layout/hierarchy4"/>
-    <dgm:cxn modelId="{B1B2BFFE-1D06-4AC3-9238-13DE61529BF1}" type="presParOf" srcId="{57B1BF5D-8B51-4CA9-A1CC-373782455A5B}" destId="{A453A851-2791-401F-A6FD-B63D6F335953}" srcOrd="1" destOrd="0" presId="urn:microsoft.com/office/officeart/2005/8/layout/hierarchy4"/>
-    <dgm:cxn modelId="{03F364B7-558A-417A-99E7-F45D8D8237DC}" type="presParOf" srcId="{A586EF35-2A45-4D18-ABB5-BF6EF3D15321}" destId="{FA76ABB4-D2A9-499A-980D-8C16B5C68A2B}" srcOrd="3" destOrd="0" presId="urn:microsoft.com/office/officeart/2005/8/layout/hierarchy4"/>
-    <dgm:cxn modelId="{2C8AC052-694A-4B1D-9C20-CB3E6A65E006}" type="presParOf" srcId="{A586EF35-2A45-4D18-ABB5-BF6EF3D15321}" destId="{344A63F9-CCB4-4686-A16A-C268F637C663}" srcOrd="4" destOrd="0" presId="urn:microsoft.com/office/officeart/2005/8/layout/hierarchy4"/>
-    <dgm:cxn modelId="{4DADBF2D-7BAA-4B5D-BC68-6083D5F43256}" type="presParOf" srcId="{344A63F9-CCB4-4686-A16A-C268F637C663}" destId="{90B1EA35-54B9-4B32-8E6B-4DA66BBD99CA}" srcOrd="0" destOrd="0" presId="urn:microsoft.com/office/officeart/2005/8/layout/hierarchy4"/>
-    <dgm:cxn modelId="{ABFE93BA-A046-4E99-A065-DC92C9F63130}" type="presParOf" srcId="{344A63F9-CCB4-4686-A16A-C268F637C663}" destId="{4868EDAB-B4D6-47FB-8818-34B345B3A91C}" srcOrd="1" destOrd="0" presId="urn:microsoft.com/office/officeart/2005/8/layout/hierarchy4"/>
-    <dgm:cxn modelId="{926C0244-7DDC-4852-B5F5-4DA71DDF6583}" type="presParOf" srcId="{A586EF35-2A45-4D18-ABB5-BF6EF3D15321}" destId="{DA4029AC-7CF6-4336-9553-909E71701A43}" srcOrd="5" destOrd="0" presId="urn:microsoft.com/office/officeart/2005/8/layout/hierarchy4"/>
-    <dgm:cxn modelId="{ED8C537F-2018-4743-8F07-233042A891AB}" type="presParOf" srcId="{A586EF35-2A45-4D18-ABB5-BF6EF3D15321}" destId="{D550CBFA-0C32-415F-A261-245A18D0D465}" srcOrd="6" destOrd="0" presId="urn:microsoft.com/office/officeart/2005/8/layout/hierarchy4"/>
-    <dgm:cxn modelId="{3FA6B2D2-599D-4CF2-8084-0D4628C359CD}" type="presParOf" srcId="{D550CBFA-0C32-415F-A261-245A18D0D465}" destId="{09E4595E-CECD-419B-8483-E158BAC637A2}" srcOrd="0" destOrd="0" presId="urn:microsoft.com/office/officeart/2005/8/layout/hierarchy4"/>
-    <dgm:cxn modelId="{AF62917B-0760-4439-835B-BEFD67F356DF}" type="presParOf" srcId="{D550CBFA-0C32-415F-A261-245A18D0D465}" destId="{92BF49A8-8CDA-4918-98D1-3260E87EDBD0}" srcOrd="1" destOrd="0" presId="urn:microsoft.com/office/officeart/2005/8/layout/hierarchy4"/>
+    <dgm:cxn modelId="{167C6130-501F-440A-9E7B-852352CB33D9}" type="presParOf" srcId="{A457FCD7-7585-452D-8B31-757F725B2F83}" destId="{AA5501CC-ADA3-4533-A9A1-065962F024AB}" srcOrd="0" destOrd="0" presId="urn:microsoft.com/office/officeart/2005/8/layout/architecture"/>
+    <dgm:cxn modelId="{F326BC7E-A4EF-452B-B445-0622FEA90777}" type="presParOf" srcId="{AA5501CC-ADA3-4533-A9A1-065962F024AB}" destId="{08233A73-9A0D-4E66-95FC-BA163A645E70}" srcOrd="0" destOrd="0" presId="urn:microsoft.com/office/officeart/2005/8/layout/architecture"/>
+    <dgm:cxn modelId="{AE2EFEBD-43C3-46DF-9104-41BDDB3F42FB}" type="presParOf" srcId="{AA5501CC-ADA3-4533-A9A1-065962F024AB}" destId="{1E3AE262-6ABE-4162-909A-4E9ED2603B0F}" srcOrd="1" destOrd="0" presId="urn:microsoft.com/office/officeart/2005/8/layout/architecture"/>
+    <dgm:cxn modelId="{19430ACF-C4E5-4352-B6A1-B2D2D95F4852}" type="presParOf" srcId="{AA5501CC-ADA3-4533-A9A1-065962F024AB}" destId="{5D075902-FDE4-4F7D-A8C3-9A2B7EBA5DE1}" srcOrd="2" destOrd="0" presId="urn:microsoft.com/office/officeart/2005/8/layout/architecture"/>
+    <dgm:cxn modelId="{A658802F-61EA-48C8-8656-728C8E6E7711}" type="presParOf" srcId="{5D075902-FDE4-4F7D-A8C3-9A2B7EBA5DE1}" destId="{53E93033-B21D-407F-A1C4-2DD302857AB0}" srcOrd="0" destOrd="0" presId="urn:microsoft.com/office/officeart/2005/8/layout/architecture"/>
+    <dgm:cxn modelId="{44D640A2-9F20-4055-8123-86C0B732BD91}" type="presParOf" srcId="{53E93033-B21D-407F-A1C4-2DD302857AB0}" destId="{B60AB936-4F9A-4736-A0EC-DC832F1A80F6}" srcOrd="0" destOrd="0" presId="urn:microsoft.com/office/officeart/2005/8/layout/architecture"/>
+    <dgm:cxn modelId="{1C8360EE-DB0A-40D3-A7A4-32B7B56762B1}" type="presParOf" srcId="{53E93033-B21D-407F-A1C4-2DD302857AB0}" destId="{AFB26770-8D90-437C-AD15-B523C13947EA}" srcOrd="1" destOrd="0" presId="urn:microsoft.com/office/officeart/2005/8/layout/architecture"/>
+    <dgm:cxn modelId="{2DED6198-6EC1-458D-B27F-E9C966720BB9}" type="presParOf" srcId="{53E93033-B21D-407F-A1C4-2DD302857AB0}" destId="{D8FD778E-DEB0-472A-B37E-E3F04564EB13}" srcOrd="2" destOrd="0" presId="urn:microsoft.com/office/officeart/2005/8/layout/architecture"/>
+    <dgm:cxn modelId="{5B4420DB-6B2C-4BCD-B45C-99379E48B846}" type="presParOf" srcId="{D8FD778E-DEB0-472A-B37E-E3F04564EB13}" destId="{A1C9B497-B456-4787-8581-915C33240C2D}" srcOrd="0" destOrd="0" presId="urn:microsoft.com/office/officeart/2005/8/layout/architecture"/>
+    <dgm:cxn modelId="{D065A9B7-7800-4484-AC79-FF676ED70015}" type="presParOf" srcId="{A1C9B497-B456-4787-8581-915C33240C2D}" destId="{5D77E15A-7581-468C-9800-762AADAB13E3}" srcOrd="0" destOrd="0" presId="urn:microsoft.com/office/officeart/2005/8/layout/architecture"/>
+    <dgm:cxn modelId="{CA6067C0-A908-4BD1-8DFC-3DAF8A117256}" type="presParOf" srcId="{A1C9B497-B456-4787-8581-915C33240C2D}" destId="{F46C9B4E-C29F-4694-A2FA-5EF8E024E11C}" srcOrd="1" destOrd="0" presId="urn:microsoft.com/office/officeart/2005/8/layout/architecture"/>
+    <dgm:cxn modelId="{6674A26F-7363-427C-9A8D-B091C50761AB}" type="presParOf" srcId="{A1C9B497-B456-4787-8581-915C33240C2D}" destId="{FF1C7EAA-706C-42CC-8CF3-2E5765BC3B94}" srcOrd="2" destOrd="0" presId="urn:microsoft.com/office/officeart/2005/8/layout/architecture"/>
+    <dgm:cxn modelId="{9B616322-A868-4DF6-B7EC-78DA41FBB91C}" type="presParOf" srcId="{FF1C7EAA-706C-42CC-8CF3-2E5765BC3B94}" destId="{62542401-9AC3-4C16-A245-C259851FAC96}" srcOrd="0" destOrd="0" presId="urn:microsoft.com/office/officeart/2005/8/layout/architecture"/>
+    <dgm:cxn modelId="{D8A4B3B0-393B-4569-97CB-86AD167C2E66}" type="presParOf" srcId="{62542401-9AC3-4C16-A245-C259851FAC96}" destId="{C43D5AE9-3214-4789-BC87-E3001FD01C27}" srcOrd="0" destOrd="0" presId="urn:microsoft.com/office/officeart/2005/8/layout/architecture"/>
+    <dgm:cxn modelId="{4277B44A-8664-4578-B50E-8374CA84CD75}" type="presParOf" srcId="{62542401-9AC3-4C16-A245-C259851FAC96}" destId="{6BE3341D-71BF-45CE-9C16-04C857A27AB2}" srcOrd="1" destOrd="0" presId="urn:microsoft.com/office/officeart/2005/8/layout/architecture"/>
+    <dgm:cxn modelId="{5631A13C-9E5F-4B5D-BAA9-329883FFABDC}" type="presParOf" srcId="{FF1C7EAA-706C-42CC-8CF3-2E5765BC3B94}" destId="{8AA85D46-C946-413D-AD35-FEE319322CFF}" srcOrd="1" destOrd="0" presId="urn:microsoft.com/office/officeart/2005/8/layout/architecture"/>
+    <dgm:cxn modelId="{A3D3A6DA-511B-48F4-8759-99804A798F16}" type="presParOf" srcId="{FF1C7EAA-706C-42CC-8CF3-2E5765BC3B94}" destId="{C19CA4DE-8954-4EA2-9C8A-5CA4B104206A}" srcOrd="2" destOrd="0" presId="urn:microsoft.com/office/officeart/2005/8/layout/architecture"/>
+    <dgm:cxn modelId="{F8C13B33-88F2-4547-BD40-5F905F4FFD01}" type="presParOf" srcId="{C19CA4DE-8954-4EA2-9C8A-5CA4B104206A}" destId="{1949C09A-0593-4247-9373-62ED81F32222}" srcOrd="0" destOrd="0" presId="urn:microsoft.com/office/officeart/2005/8/layout/architecture"/>
+    <dgm:cxn modelId="{9C42D0AF-9640-4711-8D9E-B9070C9A31A3}" type="presParOf" srcId="{C19CA4DE-8954-4EA2-9C8A-5CA4B104206A}" destId="{A1E4B383-15E1-4F8F-AA2D-B19B185A7C78}" srcOrd="1" destOrd="0" presId="urn:microsoft.com/office/officeart/2005/8/layout/architecture"/>
+    <dgm:cxn modelId="{C3B805EB-5E1D-4412-8675-251FDDDA8BD9}" type="presParOf" srcId="{FF1C7EAA-706C-42CC-8CF3-2E5765BC3B94}" destId="{4474C44D-9E30-4AFD-BD46-BCB8B407C66D}" srcOrd="3" destOrd="0" presId="urn:microsoft.com/office/officeart/2005/8/layout/architecture"/>
+    <dgm:cxn modelId="{B9D3A6A0-1833-469D-9084-95D30FC10162}" type="presParOf" srcId="{FF1C7EAA-706C-42CC-8CF3-2E5765BC3B94}" destId="{2497912A-BE84-488E-B4FD-1118FBD34D78}" srcOrd="4" destOrd="0" presId="urn:microsoft.com/office/officeart/2005/8/layout/architecture"/>
+    <dgm:cxn modelId="{E3993F5E-40E9-411B-9E84-1B0300E61FF3}" type="presParOf" srcId="{2497912A-BE84-488E-B4FD-1118FBD34D78}" destId="{059CAE2B-CF50-443E-AA57-42318D8EEB8F}" srcOrd="0" destOrd="0" presId="urn:microsoft.com/office/officeart/2005/8/layout/architecture"/>
+    <dgm:cxn modelId="{514B8FE6-6AE7-4813-9BE5-6AFF12D2FDBF}" type="presParOf" srcId="{2497912A-BE84-488E-B4FD-1118FBD34D78}" destId="{48F44CA2-56AD-47FB-9637-B06D5C58E0DD}" srcOrd="1" destOrd="0" presId="urn:microsoft.com/office/officeart/2005/8/layout/architecture"/>
+    <dgm:cxn modelId="{C9E3D888-628B-440E-95D0-BEEFB311AB6C}" type="presParOf" srcId="{FF1C7EAA-706C-42CC-8CF3-2E5765BC3B94}" destId="{4275DD66-6777-40DF-865B-77D708B75E33}" srcOrd="5" destOrd="0" presId="urn:microsoft.com/office/officeart/2005/8/layout/architecture"/>
+    <dgm:cxn modelId="{1D7C9C24-6CAB-4062-8D60-4E23438BD499}" type="presParOf" srcId="{FF1C7EAA-706C-42CC-8CF3-2E5765BC3B94}" destId="{1ADD540F-7EA5-4B32-9ADF-292F27D9942E}" srcOrd="6" destOrd="0" presId="urn:microsoft.com/office/officeart/2005/8/layout/architecture"/>
+    <dgm:cxn modelId="{C87D315A-27D1-4A51-98EB-24215CF4F663}" type="presParOf" srcId="{1ADD540F-7EA5-4B32-9ADF-292F27D9942E}" destId="{A3A03A86-F67B-477E-A931-B80DDC86DDCF}" srcOrd="0" destOrd="0" presId="urn:microsoft.com/office/officeart/2005/8/layout/architecture"/>
+    <dgm:cxn modelId="{48B02249-5389-4449-B047-17F1018BEF4E}" type="presParOf" srcId="{1ADD540F-7EA5-4B32-9ADF-292F27D9942E}" destId="{9136546F-4733-466F-8D52-29504A872090}" srcOrd="1" destOrd="0" presId="urn:microsoft.com/office/officeart/2005/8/layout/architecture"/>
   </dgm:cxnLst>
   <dgm:bg>
     <a:effectLst>
@@ -1665,14 +1670,14 @@
       <dsp:cNvGrpSpPr/>
     </dsp:nvGrpSpPr>
     <dsp:grpSpPr/>
-    <dsp:sp modelId="{69729B0A-080E-4A3E-B2F0-770C546A516A}">
+    <dsp:sp modelId="{08233A73-9A0D-4E66-95FC-BA163A645E70}">
       <dsp:nvSpPr>
         <dsp:cNvPr id="0" name=""/>
         <dsp:cNvSpPr/>
       </dsp:nvSpPr>
       <dsp:spPr>
         <a:xfrm>
-          <a:off x="710" y="598"/>
+          <a:off x="710" y="4544070"/>
           <a:ext cx="11726388" cy="1362968"/>
         </a:xfrm>
         <a:prstGeom prst="roundRect">
@@ -1794,18 +1799,18 @@
         </a:p>
       </dsp:txBody>
       <dsp:txXfrm>
-        <a:off x="40630" y="40518"/>
+        <a:off x="40630" y="4583990"/>
         <a:ext cx="11646548" cy="1283128"/>
       </dsp:txXfrm>
     </dsp:sp>
-    <dsp:sp modelId="{3CDD9677-3892-4F7E-92AD-87DCCE0D81CB}">
+    <dsp:sp modelId="{B60AB936-4F9A-4736-A0EC-DC832F1A80F6}">
       <dsp:nvSpPr>
         <dsp:cNvPr id="0" name=""/>
         <dsp:cNvSpPr/>
       </dsp:nvSpPr>
       <dsp:spPr>
         <a:xfrm>
-          <a:off x="710" y="1515089"/>
+          <a:off x="710" y="3029579"/>
           <a:ext cx="11726388" cy="1362968"/>
         </a:xfrm>
         <a:prstGeom prst="roundRect">
@@ -1918,18 +1923,18 @@
         </a:p>
       </dsp:txBody>
       <dsp:txXfrm>
-        <a:off x="40630" y="1555009"/>
+        <a:off x="40630" y="3069499"/>
         <a:ext cx="11646548" cy="1283128"/>
       </dsp:txXfrm>
     </dsp:sp>
-    <dsp:sp modelId="{2FE62EC0-C842-428A-B906-DD4A34CDC1CF}">
+    <dsp:sp modelId="{5D77E15A-7581-468C-9800-762AADAB13E3}">
       <dsp:nvSpPr>
         <dsp:cNvPr id="0" name=""/>
         <dsp:cNvSpPr/>
       </dsp:nvSpPr>
       <dsp:spPr>
         <a:xfrm>
-          <a:off x="710" y="3029579"/>
+          <a:off x="710" y="1515089"/>
           <a:ext cx="11726388" cy="1362968"/>
         </a:xfrm>
         <a:prstGeom prst="roundRect">
@@ -2042,18 +2047,18 @@
         </a:p>
       </dsp:txBody>
       <dsp:txXfrm>
-        <a:off x="40630" y="3069499"/>
+        <a:off x="40630" y="1555009"/>
         <a:ext cx="11646548" cy="1283128"/>
       </dsp:txXfrm>
     </dsp:sp>
-    <dsp:sp modelId="{59D12D5A-EFE0-482C-A94F-56460B06118C}">
+    <dsp:sp modelId="{C43D5AE9-3214-4789-BC87-E3001FD01C27}">
       <dsp:nvSpPr>
         <dsp:cNvPr id="0" name=""/>
         <dsp:cNvSpPr/>
       </dsp:nvSpPr>
       <dsp:spPr>
         <a:xfrm>
-          <a:off x="710" y="4544070"/>
+          <a:off x="710" y="598"/>
           <a:ext cx="2886140" cy="1362968"/>
         </a:xfrm>
         <a:prstGeom prst="roundRect">
@@ -2175,18 +2180,18 @@
         </a:p>
       </dsp:txBody>
       <dsp:txXfrm>
-        <a:off x="40630" y="4583990"/>
+        <a:off x="40630" y="40518"/>
         <a:ext cx="2806300" cy="1283128"/>
       </dsp:txXfrm>
     </dsp:sp>
-    <dsp:sp modelId="{D1F5E78B-25DE-428E-B813-08806B9B7793}">
+    <dsp:sp modelId="{1949C09A-0593-4247-9373-62ED81F32222}">
       <dsp:nvSpPr>
         <dsp:cNvPr id="0" name=""/>
         <dsp:cNvSpPr/>
       </dsp:nvSpPr>
       <dsp:spPr>
         <a:xfrm>
-          <a:off x="2947459" y="4544070"/>
+          <a:off x="2947459" y="598"/>
           <a:ext cx="2886140" cy="1362968"/>
         </a:xfrm>
         <a:prstGeom prst="roundRect">
@@ -2311,18 +2316,18 @@
         </a:p>
       </dsp:txBody>
       <dsp:txXfrm>
-        <a:off x="2987379" y="4583990"/>
+        <a:off x="2987379" y="40518"/>
         <a:ext cx="2806300" cy="1283128"/>
       </dsp:txXfrm>
     </dsp:sp>
-    <dsp:sp modelId="{90B1EA35-54B9-4B32-8E6B-4DA66BBD99CA}">
+    <dsp:sp modelId="{059CAE2B-CF50-443E-AA57-42318D8EEB8F}">
       <dsp:nvSpPr>
         <dsp:cNvPr id="0" name=""/>
         <dsp:cNvSpPr/>
       </dsp:nvSpPr>
       <dsp:spPr>
         <a:xfrm>
-          <a:off x="5894208" y="4544070"/>
+          <a:off x="5894208" y="598"/>
           <a:ext cx="2886140" cy="1362968"/>
         </a:xfrm>
         <a:prstGeom prst="roundRect">
@@ -2444,18 +2449,18 @@
         </a:p>
       </dsp:txBody>
       <dsp:txXfrm>
-        <a:off x="5934128" y="4583990"/>
+        <a:off x="5934128" y="40518"/>
         <a:ext cx="2806300" cy="1283128"/>
       </dsp:txXfrm>
     </dsp:sp>
-    <dsp:sp modelId="{09E4595E-CECD-419B-8483-E158BAC637A2}">
+    <dsp:sp modelId="{A3A03A86-F67B-477E-A931-B80DDC86DDCF}">
       <dsp:nvSpPr>
         <dsp:cNvPr id="0" name=""/>
         <dsp:cNvSpPr/>
       </dsp:nvSpPr>
       <dsp:spPr>
         <a:xfrm>
-          <a:off x="8840958" y="4544070"/>
+          <a:off x="8840958" y="598"/>
           <a:ext cx="2886140" cy="1362968"/>
         </a:xfrm>
         <a:prstGeom prst="roundRect">
@@ -2580,7 +2585,7 @@
         </a:p>
       </dsp:txBody>
       <dsp:txXfrm>
-        <a:off x="8880878" y="4583990"/>
+        <a:off x="8880878" y="40518"/>
         <a:ext cx="2806300" cy="1283128"/>
       </dsp:txXfrm>
     </dsp:sp>
@@ -2589,13 +2594,14 @@
 </file>
 
 <file path=ppt/diagrams/layout1.xml><?xml version="1.0" encoding="utf-8"?>
-<dgm:layoutDef xmlns:dgm="http://schemas.openxmlformats.org/drawingml/2006/diagram" xmlns:a="http://schemas.openxmlformats.org/drawingml/2006/main" uniqueId="urn:microsoft.com/office/officeart/2005/8/layout/hierarchy4">
-  <dgm:title val=""/>
-  <dgm:desc val=""/>
+<dgm:layoutDef xmlns:dgm="http://schemas.openxmlformats.org/drawingml/2006/diagram" xmlns:a="http://schemas.openxmlformats.org/drawingml/2006/main" uniqueId="urn:microsoft.com/office/officeart/2005/8/layout/architecture">
+  <dgm:title val="Architecture Layout"/>
+  <dgm:desc val="Use to show hierarchical relationships that build from the bottom up. This layout works well for showing architectural components or objects that build on other objects."/>
   <dgm:catLst>
-    <dgm:cat type="hierarchy" pri="4000"/>
-    <dgm:cat type="list" pri="24000"/>
-    <dgm:cat type="relationship" pri="10000"/>
+    <dgm:cat type="hierarchy" pri="4500"/>
+    <dgm:cat type="list" pri="24500"/>
+    <dgm:cat type="relationship" pri="10500"/>
+    <dgm:cat type="officeonline" pri="7000"/>
   </dgm:catLst>
   <dgm:sampData>
     <dgm:dataModel>
@@ -2686,13 +2692,13 @@
       <dgm:if name="Name2" func="var" arg="dir" op="equ" val="norm">
         <dgm:alg type="lin">
           <dgm:param type="linDir" val="fromL"/>
-          <dgm:param type="nodeVertAlign" val="t"/>
+          <dgm:param type="nodeVertAlign" val="b"/>
         </dgm:alg>
       </dgm:if>
       <dgm:else name="Name3">
         <dgm:alg type="lin">
           <dgm:param type="linDir" val="fromR"/>
-          <dgm:param type="nodeVertAlign" val="t"/>
+          <dgm:param type="nodeVertAlign" val="b"/>
         </dgm:alg>
       </dgm:else>
     </dgm:choose>
@@ -2739,7 +2745,7 @@
     <dgm:forEach name="Name4" axis="ch" ptType="node">
       <dgm:layoutNode name="vertOne">
         <dgm:alg type="lin">
-          <dgm:param type="linDir" val="fromT"/>
+          <dgm:param type="linDir" val="fromB"/>
         </dgm:alg>
         <dgm:shape xmlns:r="http://schemas.openxmlformats.org/officeDocument/2006/relationships" r:blip="">
           <dgm:adjLst/>
@@ -2789,13 +2795,13 @@
             <dgm:if name="Name9" func="var" arg="dir" op="equ" val="norm">
               <dgm:alg type="lin">
                 <dgm:param type="linDir" val="fromL"/>
-                <dgm:param type="nodeVertAlign" val="t"/>
+                <dgm:param type="nodeVertAlign" val="b"/>
               </dgm:alg>
             </dgm:if>
             <dgm:else name="Name10">
               <dgm:alg type="lin">
                 <dgm:param type="linDir" val="fromR"/>
-                <dgm:param type="nodeVertAlign" val="t"/>
+                <dgm:param type="nodeVertAlign" val="b"/>
               </dgm:alg>
             </dgm:else>
           </dgm:choose>
@@ -2810,7 +2816,7 @@
           <dgm:forEach name="Name11" axis="ch" ptType="node">
             <dgm:layoutNode name="vertTwo">
               <dgm:alg type="lin">
-                <dgm:param type="linDir" val="fromT"/>
+                <dgm:param type="linDir" val="fromB"/>
               </dgm:alg>
               <dgm:shape xmlns:r="http://schemas.openxmlformats.org/officeDocument/2006/relationships" r:blip="">
                 <dgm:adjLst/>
@@ -2862,13 +2868,13 @@
                   <dgm:if name="Name16" func="var" arg="dir" op="equ" val="norm">
                     <dgm:alg type="lin">
                       <dgm:param type="linDir" val="fromL"/>
-                      <dgm:param type="nodeVertAlign" val="t"/>
+                      <dgm:param type="nodeVertAlign" val="b"/>
                     </dgm:alg>
                   </dgm:if>
                   <dgm:else name="Name17">
                     <dgm:alg type="lin">
                       <dgm:param type="linDir" val="fromR"/>
-                      <dgm:param type="nodeVertAlign" val="t"/>
+                      <dgm:param type="nodeVertAlign" val="b"/>
                     </dgm:alg>
                   </dgm:else>
                 </dgm:choose>
@@ -2883,7 +2889,7 @@
                 <dgm:forEach name="Name18" axis="ch" ptType="node">
                   <dgm:layoutNode name="vertThree">
                     <dgm:alg type="lin">
-                      <dgm:param type="linDir" val="fromT"/>
+                      <dgm:param type="linDir" val="fromB"/>
                     </dgm:alg>
                     <dgm:shape xmlns:r="http://schemas.openxmlformats.org/officeDocument/2006/relationships" r:blip="">
                       <dgm:adjLst/>
@@ -2935,13 +2941,13 @@
                         <dgm:if name="Name23" func="var" arg="dir" op="equ" val="norm">
                           <dgm:alg type="lin">
                             <dgm:param type="linDir" val="fromL"/>
-                            <dgm:param type="nodeVertAlign" val="t"/>
+                            <dgm:param type="nodeVertAlign" val="b"/>
                           </dgm:alg>
                         </dgm:if>
                         <dgm:else name="Name24">
                           <dgm:alg type="lin">
                             <dgm:param type="linDir" val="fromR"/>
-                            <dgm:param type="nodeVertAlign" val="t"/>
+                            <dgm:param type="nodeVertAlign" val="b"/>
                           </dgm:alg>
                         </dgm:else>
                       </dgm:choose>
@@ -2959,7 +2965,7 @@
                             <dgm:chPref val="3"/>
                           </dgm:varLst>
                           <dgm:alg type="lin">
-                            <dgm:param type="linDir" val="fromT"/>
+                            <dgm:param type="linDir" val="fromB"/>
                           </dgm:alg>
                           <dgm:shape xmlns:r="http://schemas.openxmlformats.org/officeDocument/2006/relationships" r:blip="">
                             <dgm:adjLst/>
@@ -3011,13 +3017,13 @@
                               <dgm:if name="Name29" func="var" arg="dir" op="equ" val="norm">
                                 <dgm:alg type="lin">
                                   <dgm:param type="linDir" val="fromL"/>
-                                  <dgm:param type="nodeVertAlign" val="t"/>
+                                  <dgm:param type="nodeVertAlign" val="b"/>
                                 </dgm:alg>
                               </dgm:if>
                               <dgm:else name="Name30">
                                 <dgm:alg type="lin">
                                   <dgm:param type="linDir" val="fromR"/>
-                                  <dgm:param type="nodeVertAlign" val="t"/>
+                                  <dgm:param type="nodeVertAlign" val="b"/>
                                 </dgm:alg>
                               </dgm:else>
                             </dgm:choose>
@@ -4519,7 +4525,7 @@
           <a:p>
             <a:fld id="{67ECCB9E-267D-442F-A884-15AB5B5F6C40}" type="datetimeFigureOut">
               <a:rPr lang="en-US" smtClean="0"/>
-              <a:t>8/3/2020</a:t>
+              <a:t>8/4/2020</a:t>
             </a:fld>
             <a:endParaRPr lang="en-US"/>
           </a:p>
@@ -4717,7 +4723,7 @@
           <a:p>
             <a:fld id="{67ECCB9E-267D-442F-A884-15AB5B5F6C40}" type="datetimeFigureOut">
               <a:rPr lang="en-US" smtClean="0"/>
-              <a:t>8/3/2020</a:t>
+              <a:t>8/4/2020</a:t>
             </a:fld>
             <a:endParaRPr lang="en-US"/>
           </a:p>
@@ -4925,7 +4931,7 @@
           <a:p>
             <a:fld id="{67ECCB9E-267D-442F-A884-15AB5B5F6C40}" type="datetimeFigureOut">
               <a:rPr lang="en-US" smtClean="0"/>
-              <a:t>8/3/2020</a:t>
+              <a:t>8/4/2020</a:t>
             </a:fld>
             <a:endParaRPr lang="en-US"/>
           </a:p>
@@ -5123,7 +5129,7 @@
           <a:p>
             <a:fld id="{67ECCB9E-267D-442F-A884-15AB5B5F6C40}" type="datetimeFigureOut">
               <a:rPr lang="en-US" smtClean="0"/>
-              <a:t>8/3/2020</a:t>
+              <a:t>8/4/2020</a:t>
             </a:fld>
             <a:endParaRPr lang="en-US"/>
           </a:p>
@@ -5398,7 +5404,7 @@
           <a:p>
             <a:fld id="{67ECCB9E-267D-442F-A884-15AB5B5F6C40}" type="datetimeFigureOut">
               <a:rPr lang="en-US" smtClean="0"/>
-              <a:t>8/3/2020</a:t>
+              <a:t>8/4/2020</a:t>
             </a:fld>
             <a:endParaRPr lang="en-US"/>
           </a:p>
@@ -5663,7 +5669,7 @@
           <a:p>
             <a:fld id="{67ECCB9E-267D-442F-A884-15AB5B5F6C40}" type="datetimeFigureOut">
               <a:rPr lang="en-US" smtClean="0"/>
-              <a:t>8/3/2020</a:t>
+              <a:t>8/4/2020</a:t>
             </a:fld>
             <a:endParaRPr lang="en-US"/>
           </a:p>
@@ -6075,7 +6081,7 @@
           <a:p>
             <a:fld id="{67ECCB9E-267D-442F-A884-15AB5B5F6C40}" type="datetimeFigureOut">
               <a:rPr lang="en-US" smtClean="0"/>
-              <a:t>8/3/2020</a:t>
+              <a:t>8/4/2020</a:t>
             </a:fld>
             <a:endParaRPr lang="en-US"/>
           </a:p>
@@ -6216,7 +6222,7 @@
           <a:p>
             <a:fld id="{67ECCB9E-267D-442F-A884-15AB5B5F6C40}" type="datetimeFigureOut">
               <a:rPr lang="en-US" smtClean="0"/>
-              <a:t>8/3/2020</a:t>
+              <a:t>8/4/2020</a:t>
             </a:fld>
             <a:endParaRPr lang="en-US"/>
           </a:p>
@@ -6329,7 +6335,7 @@
           <a:p>
             <a:fld id="{67ECCB9E-267D-442F-A884-15AB5B5F6C40}" type="datetimeFigureOut">
               <a:rPr lang="en-US" smtClean="0"/>
-              <a:t>8/3/2020</a:t>
+              <a:t>8/4/2020</a:t>
             </a:fld>
             <a:endParaRPr lang="en-US"/>
           </a:p>
@@ -6640,7 +6646,7 @@
           <a:p>
             <a:fld id="{67ECCB9E-267D-442F-A884-15AB5B5F6C40}" type="datetimeFigureOut">
               <a:rPr lang="en-US" smtClean="0"/>
-              <a:t>8/3/2020</a:t>
+              <a:t>8/4/2020</a:t>
             </a:fld>
             <a:endParaRPr lang="en-US"/>
           </a:p>
@@ -6928,7 +6934,7 @@
           <a:p>
             <a:fld id="{67ECCB9E-267D-442F-A884-15AB5B5F6C40}" type="datetimeFigureOut">
               <a:rPr lang="en-US" smtClean="0"/>
-              <a:t>8/3/2020</a:t>
+              <a:t>8/4/2020</a:t>
             </a:fld>
             <a:endParaRPr lang="en-US"/>
           </a:p>
@@ -7169,7 +7175,7 @@
           <a:p>
             <a:fld id="{67ECCB9E-267D-442F-A884-15AB5B5F6C40}" type="datetimeFigureOut">
               <a:rPr lang="en-US" smtClean="0"/>
-              <a:t>8/3/2020</a:t>
+              <a:t>8/4/2020</a:t>
             </a:fld>
             <a:endParaRPr lang="en-US"/>
           </a:p>
@@ -7599,7 +7605,7 @@
           <p:nvPr>
             <p:extLst>
               <p:ext uri="{D42A27DB-BD31-4B8C-83A1-F6EECF244321}">
-                <p14:modId xmlns:p14="http://schemas.microsoft.com/office/powerpoint/2010/main" val="3187710220"/>
+                <p14:modId xmlns:p14="http://schemas.microsoft.com/office/powerpoint/2010/main" val="2799635810"/>
               </p:ext>
             </p:extLst>
           </p:nvPr>

</xml_diff>